<commit_message>
Update pictures for simplified approach Fixes #1206
</commit_message>
<xml_diff>
--- a/spec/additionalDescription/pictures/CyclicCCRetrievalPics.pptx
+++ b/spec/additionalDescription/pictures/CyclicCCRetrievalPics.pptx
@@ -262,7 +262,7 @@
           <a:p>
             <a:fld id="{6D855B84-74D2-4046-835B-2839D0C69BA2}" type="datetimeFigureOut">
               <a:rPr lang="de-DE" smtClean="0"/>
-              <a:t>15.05.2025</a:t>
+              <a:t>19.05.2025</a:t>
             </a:fld>
             <a:endParaRPr lang="de-DE"/>
           </a:p>
@@ -460,7 +460,7 @@
           <a:p>
             <a:fld id="{6D855B84-74D2-4046-835B-2839D0C69BA2}" type="datetimeFigureOut">
               <a:rPr lang="de-DE" smtClean="0"/>
-              <a:t>15.05.2025</a:t>
+              <a:t>19.05.2025</a:t>
             </a:fld>
             <a:endParaRPr lang="de-DE"/>
           </a:p>
@@ -668,7 +668,7 @@
           <a:p>
             <a:fld id="{6D855B84-74D2-4046-835B-2839D0C69BA2}" type="datetimeFigureOut">
               <a:rPr lang="de-DE" smtClean="0"/>
-              <a:t>15.05.2025</a:t>
+              <a:t>19.05.2025</a:t>
             </a:fld>
             <a:endParaRPr lang="de-DE"/>
           </a:p>
@@ -866,7 +866,7 @@
           <a:p>
             <a:fld id="{6D855B84-74D2-4046-835B-2839D0C69BA2}" type="datetimeFigureOut">
               <a:rPr lang="de-DE" smtClean="0"/>
-              <a:t>15.05.2025</a:t>
+              <a:t>19.05.2025</a:t>
             </a:fld>
             <a:endParaRPr lang="de-DE"/>
           </a:p>
@@ -1141,7 +1141,7 @@
           <a:p>
             <a:fld id="{6D855B84-74D2-4046-835B-2839D0C69BA2}" type="datetimeFigureOut">
               <a:rPr lang="de-DE" smtClean="0"/>
-              <a:t>15.05.2025</a:t>
+              <a:t>19.05.2025</a:t>
             </a:fld>
             <a:endParaRPr lang="de-DE"/>
           </a:p>
@@ -1406,7 +1406,7 @@
           <a:p>
             <a:fld id="{6D855B84-74D2-4046-835B-2839D0C69BA2}" type="datetimeFigureOut">
               <a:rPr lang="de-DE" smtClean="0"/>
-              <a:t>15.05.2025</a:t>
+              <a:t>19.05.2025</a:t>
             </a:fld>
             <a:endParaRPr lang="de-DE"/>
           </a:p>
@@ -1818,7 +1818,7 @@
           <a:p>
             <a:fld id="{6D855B84-74D2-4046-835B-2839D0C69BA2}" type="datetimeFigureOut">
               <a:rPr lang="de-DE" smtClean="0"/>
-              <a:t>15.05.2025</a:t>
+              <a:t>19.05.2025</a:t>
             </a:fld>
             <a:endParaRPr lang="de-DE"/>
           </a:p>
@@ -1959,7 +1959,7 @@
           <a:p>
             <a:fld id="{6D855B84-74D2-4046-835B-2839D0C69BA2}" type="datetimeFigureOut">
               <a:rPr lang="de-DE" smtClean="0"/>
-              <a:t>15.05.2025</a:t>
+              <a:t>19.05.2025</a:t>
             </a:fld>
             <a:endParaRPr lang="de-DE"/>
           </a:p>
@@ -2072,7 +2072,7 @@
           <a:p>
             <a:fld id="{6D855B84-74D2-4046-835B-2839D0C69BA2}" type="datetimeFigureOut">
               <a:rPr lang="de-DE" smtClean="0"/>
-              <a:t>15.05.2025</a:t>
+              <a:t>19.05.2025</a:t>
             </a:fld>
             <a:endParaRPr lang="de-DE"/>
           </a:p>
@@ -2383,7 +2383,7 @@
           <a:p>
             <a:fld id="{6D855B84-74D2-4046-835B-2839D0C69BA2}" type="datetimeFigureOut">
               <a:rPr lang="de-DE" smtClean="0"/>
-              <a:t>15.05.2025</a:t>
+              <a:t>19.05.2025</a:t>
             </a:fld>
             <a:endParaRPr lang="de-DE"/>
           </a:p>
@@ -2671,7 +2671,7 @@
           <a:p>
             <a:fld id="{6D855B84-74D2-4046-835B-2839D0C69BA2}" type="datetimeFigureOut">
               <a:rPr lang="de-DE" smtClean="0"/>
-              <a:t>15.05.2025</a:t>
+              <a:t>19.05.2025</a:t>
             </a:fld>
             <a:endParaRPr lang="de-DE"/>
           </a:p>
@@ -2912,7 +2912,7 @@
           <a:p>
             <a:fld id="{6D855B84-74D2-4046-835B-2839D0C69BA2}" type="datetimeFigureOut">
               <a:rPr lang="de-DE" smtClean="0"/>
-              <a:t>15.05.2025</a:t>
+              <a:t>19.05.2025</a:t>
             </a:fld>
             <a:endParaRPr lang="de-DE"/>
           </a:p>
@@ -4047,8 +4047,8 @@
         </p:blipFill>
         <p:spPr>
           <a:xfrm>
-            <a:off x="5649277" y="2998216"/>
-            <a:ext cx="243158" cy="303949"/>
+            <a:off x="7016371" y="2541911"/>
+            <a:ext cx="162550" cy="203189"/>
           </a:xfrm>
           <a:prstGeom prst="rect">
             <a:avLst/>
@@ -4077,8 +4077,8 @@
         </p:blipFill>
         <p:spPr>
           <a:xfrm>
-            <a:off x="5876589" y="3007663"/>
-            <a:ext cx="243158" cy="303949"/>
+            <a:off x="7243683" y="2551358"/>
+            <a:ext cx="162550" cy="203189"/>
           </a:xfrm>
           <a:prstGeom prst="rect">
             <a:avLst/>
@@ -4107,8 +4107,8 @@
         </p:blipFill>
         <p:spPr>
           <a:xfrm>
-            <a:off x="5740941" y="3092131"/>
-            <a:ext cx="243158" cy="303949"/>
+            <a:off x="7108035" y="2635826"/>
+            <a:ext cx="162550" cy="203189"/>
           </a:xfrm>
           <a:prstGeom prst="rect">
             <a:avLst/>
@@ -4218,51 +4218,6 @@
       </p:sp>
       <p:cxnSp>
         <p:nvCxnSpPr>
-          <p:cNvPr id="31" name="Gerade Verbindung mit Pfeil 30">
-            <a:extLst>
-              <a:ext uri="{FF2B5EF4-FFF2-40B4-BE49-F238E27FC236}">
-                <a16:creationId xmlns:a16="http://schemas.microsoft.com/office/drawing/2014/main" id="{8146DA12-CE11-D5AB-CD39-C958B9660FCD}"/>
-              </a:ext>
-            </a:extLst>
-          </p:cNvPr>
-          <p:cNvCxnSpPr>
-            <a:cxnSpLocks/>
-            <a:endCxn id="19" idx="1"/>
-          </p:cNvCxnSpPr>
-          <p:nvPr/>
-        </p:nvCxnSpPr>
-        <p:spPr>
-          <a:xfrm>
-            <a:off x="5026370" y="3144761"/>
-            <a:ext cx="622907" cy="5430"/>
-          </a:xfrm>
-          <a:prstGeom prst="straightConnector1">
-            <a:avLst/>
-          </a:prstGeom>
-          <a:ln w="12700">
-            <a:solidFill>
-              <a:srgbClr val="C00000"/>
-            </a:solidFill>
-            <a:tailEnd type="triangle"/>
-          </a:ln>
-        </p:spPr>
-        <p:style>
-          <a:lnRef idx="1">
-            <a:schemeClr val="accent1"/>
-          </a:lnRef>
-          <a:fillRef idx="0">
-            <a:schemeClr val="accent1"/>
-          </a:fillRef>
-          <a:effectRef idx="0">
-            <a:schemeClr val="accent1"/>
-          </a:effectRef>
-          <a:fontRef idx="minor">
-            <a:schemeClr val="tx1"/>
-          </a:fontRef>
-        </p:style>
-      </p:cxnSp>
-      <p:cxnSp>
-        <p:nvCxnSpPr>
           <p:cNvPr id="25" name="Gerade Verbindung mit Pfeil 24">
             <a:extLst>
               <a:ext uri="{FF2B5EF4-FFF2-40B4-BE49-F238E27FC236}">
@@ -4319,7 +4274,7 @@
         </p:nvSpPr>
         <p:spPr>
           <a:xfrm>
-            <a:off x="4933276" y="3034277"/>
+            <a:off x="6164960" y="3197868"/>
             <a:ext cx="156893" cy="148292"/>
           </a:xfrm>
           <a:prstGeom prst="mathMultiply">
@@ -4408,7 +4363,7 @@
         </p:nvSpPr>
         <p:spPr>
           <a:xfrm>
-            <a:off x="6149352" y="3007663"/>
+            <a:off x="7378612" y="2551358"/>
             <a:ext cx="1232922" cy="415498"/>
           </a:xfrm>
           <a:prstGeom prst="rect">
@@ -4754,72 +4709,74 @@
           </a:p>
         </p:txBody>
       </p:sp>
-      <p:pic>
-        <p:nvPicPr>
-          <p:cNvPr id="6" name="Grafik 5" descr="Datenbank mit einfarbiger Füllung">
+      <p:sp>
+        <p:nvSpPr>
+          <p:cNvPr id="2" name="Textfeld 1">
             <a:extLst>
               <a:ext uri="{FF2B5EF4-FFF2-40B4-BE49-F238E27FC236}">
-                <a16:creationId xmlns:a16="http://schemas.microsoft.com/office/drawing/2014/main" id="{BE55161C-BF46-A045-BBA7-1CDEF3EA05CB}"/>
+                <a16:creationId xmlns:a16="http://schemas.microsoft.com/office/drawing/2014/main" id="{18984DF3-EEE9-6157-84A4-98E1809B735B}"/>
               </a:ext>
             </a:extLst>
           </p:cNvPr>
-          <p:cNvPicPr>
-            <a:picLocks noChangeAspect="1"/>
-          </p:cNvPicPr>
+          <p:cNvSpPr txBox="1"/>
           <p:nvPr/>
-        </p:nvPicPr>
-        <p:blipFill>
-          <a:blip r:embed="rId8">
-            <a:extLst>
-              <a:ext uri="{28A0092B-C50C-407E-A947-70E740481C1C}">
-                <a14:useLocalDpi xmlns:a14="http://schemas.microsoft.com/office/drawing/2010/main" val="0"/>
-              </a:ext>
-              <a:ext uri="{96DAC541-7B7A-43D3-8B79-37D633B846F1}">
-                <asvg:svgBlip xmlns:asvg="http://schemas.microsoft.com/office/drawing/2016/SVG/main" r:embed="rId9"/>
-              </a:ext>
-            </a:extLst>
-          </a:blip>
-          <a:stretch>
-            <a:fillRect/>
-          </a:stretch>
-        </p:blipFill>
+        </p:nvSpPr>
         <p:spPr>
           <a:xfrm>
-            <a:off x="7376160" y="2510834"/>
-            <a:ext cx="331940" cy="331940"/>
+            <a:off x="5528538" y="2889315"/>
+            <a:ext cx="1055777" cy="338554"/>
           </a:xfrm>
           <a:prstGeom prst="rect">
             <a:avLst/>
           </a:prstGeom>
+          <a:noFill/>
         </p:spPr>
-      </p:pic>
-      <p:cxnSp>
-        <p:nvCxnSpPr>
-          <p:cNvPr id="8" name="Gerade Verbindung mit Pfeil 7">
+        <p:txBody>
+          <a:bodyPr wrap="square" rtlCol="0">
+            <a:spAutoFit/>
+          </a:bodyPr>
+          <a:lstStyle/>
+          <a:p>
+            <a:r>
+              <a:rPr lang="de-DE" sz="800" i="1">
+                <a:solidFill>
+                  <a:srgbClr val="820000"/>
+                </a:solidFill>
+              </a:rPr>
+              <a:t>mark as disconnected</a:t>
+            </a:r>
+          </a:p>
+        </p:txBody>
+      </p:sp>
+      <p:sp>
+        <p:nvSpPr>
+          <p:cNvPr id="26" name="Bogen 25">
             <a:extLst>
               <a:ext uri="{FF2B5EF4-FFF2-40B4-BE49-F238E27FC236}">
-                <a16:creationId xmlns:a16="http://schemas.microsoft.com/office/drawing/2014/main" id="{CE5BA924-5DD3-4ADD-8D2E-1299CF2E5968}"/>
+                <a16:creationId xmlns:a16="http://schemas.microsoft.com/office/drawing/2014/main" id="{1BC6B240-0F98-B71F-AE36-7AFBA8FC3788}"/>
               </a:ext>
             </a:extLst>
           </p:cNvPr>
-          <p:cNvCxnSpPr>
-            <a:cxnSpLocks/>
-          </p:cNvCxnSpPr>
+          <p:cNvSpPr/>
           <p:nvPr/>
-        </p:nvCxnSpPr>
+        </p:nvSpPr>
         <p:spPr>
-          <a:xfrm>
-            <a:off x="6740108" y="2699617"/>
-            <a:ext cx="658694" cy="0"/>
+          <a:xfrm rot="9548030">
+            <a:off x="4892079" y="2146833"/>
+            <a:ext cx="3066540" cy="1041484"/>
           </a:xfrm>
-          <a:prstGeom prst="straightConnector1">
-            <a:avLst/>
+          <a:prstGeom prst="arc">
+            <a:avLst>
+              <a:gd name="adj1" fmla="val 13238382"/>
+              <a:gd name="adj2" fmla="val 246424"/>
+            </a:avLst>
           </a:prstGeom>
           <a:ln w="12700">
             <a:solidFill>
-              <a:srgbClr val="00B050"/>
+              <a:srgbClr val="C00000"/>
             </a:solidFill>
-            <a:tailEnd type="triangle"/>
+            <a:headEnd type="triangle"/>
+            <a:tailEnd type="none"/>
           </a:ln>
         </p:spPr>
         <p:style>
@@ -4836,54 +4793,6 @@
             <a:schemeClr val="tx1"/>
           </a:fontRef>
         </p:style>
-      </p:cxnSp>
-      <p:sp>
-        <p:nvSpPr>
-          <p:cNvPr id="10" name="Additionszeichen 9">
-            <a:extLst>
-              <a:ext uri="{FF2B5EF4-FFF2-40B4-BE49-F238E27FC236}">
-                <a16:creationId xmlns:a16="http://schemas.microsoft.com/office/drawing/2014/main" id="{DDE83E1A-C219-5106-F2DF-A518AD0F3EB8}"/>
-              </a:ext>
-            </a:extLst>
-          </p:cNvPr>
-          <p:cNvSpPr/>
-          <p:nvPr/>
-        </p:nvSpPr>
-        <p:spPr>
-          <a:xfrm>
-            <a:off x="6974205" y="2611327"/>
-            <a:ext cx="190500" cy="176580"/>
-          </a:xfrm>
-          <a:prstGeom prst="mathPlus">
-            <a:avLst/>
-          </a:prstGeom>
-          <a:solidFill>
-            <a:srgbClr val="92D050"/>
-          </a:solidFill>
-          <a:ln>
-            <a:solidFill>
-              <a:schemeClr val="accent6">
-                <a:lumMod val="75000"/>
-              </a:schemeClr>
-            </a:solidFill>
-          </a:ln>
-        </p:spPr>
-        <p:style>
-          <a:lnRef idx="2">
-            <a:schemeClr val="accent1">
-              <a:shade val="50000"/>
-            </a:schemeClr>
-          </a:lnRef>
-          <a:fillRef idx="1">
-            <a:schemeClr val="accent1"/>
-          </a:fillRef>
-          <a:effectRef idx="0">
-            <a:schemeClr val="accent1"/>
-          </a:effectRef>
-          <a:fontRef idx="minor">
-            <a:schemeClr val="lt1"/>
-          </a:fontRef>
-        </p:style>
         <p:txBody>
           <a:bodyPr rtlCol="0" anchor="ctr"/>
           <a:lstStyle/>
@@ -4895,10 +4804,10 @@
       </p:sp>
       <p:sp>
         <p:nvSpPr>
-          <p:cNvPr id="13" name="Textfeld 12">
+          <p:cNvPr id="14" name="Textfeld 13">
             <a:extLst>
               <a:ext uri="{FF2B5EF4-FFF2-40B4-BE49-F238E27FC236}">
-                <a16:creationId xmlns:a16="http://schemas.microsoft.com/office/drawing/2014/main" id="{9E380CBA-918A-1C8B-8C49-5261C2678B39}"/>
+                <a16:creationId xmlns:a16="http://schemas.microsoft.com/office/drawing/2014/main" id="{BD754854-D137-EF79-F17C-7AD54F23AF14}"/>
               </a:ext>
             </a:extLst>
           </p:cNvPr>
@@ -4907,8 +4816,47 @@
         </p:nvSpPr>
         <p:spPr>
           <a:xfrm>
-            <a:off x="7688182" y="2571245"/>
-            <a:ext cx="739856" cy="415498"/>
+            <a:off x="6217225" y="3070617"/>
+            <a:ext cx="292068" cy="369332"/>
+          </a:xfrm>
+          <a:prstGeom prst="rect">
+            <a:avLst/>
+          </a:prstGeom>
+          <a:noFill/>
+        </p:spPr>
+        <p:txBody>
+          <a:bodyPr wrap="none" rtlCol="0">
+            <a:spAutoFit/>
+          </a:bodyPr>
+          <a:lstStyle/>
+          <a:p>
+            <a:r>
+              <a:rPr lang="de-DE">
+                <a:solidFill>
+                  <a:srgbClr val="820000"/>
+                </a:solidFill>
+              </a:rPr>
+              <a:t>?</a:t>
+            </a:r>
+          </a:p>
+        </p:txBody>
+      </p:sp>
+      <p:sp>
+        <p:nvSpPr>
+          <p:cNvPr id="27" name="Textfeld 26">
+            <a:extLst>
+              <a:ext uri="{FF2B5EF4-FFF2-40B4-BE49-F238E27FC236}">
+                <a16:creationId xmlns:a16="http://schemas.microsoft.com/office/drawing/2014/main" id="{9A186306-13C3-DD88-45D1-56AB280176E9}"/>
+              </a:ext>
+            </a:extLst>
+          </p:cNvPr>
+          <p:cNvSpPr txBox="1"/>
+          <p:nvPr/>
+        </p:nvSpPr>
+        <p:spPr>
+          <a:xfrm>
+            <a:off x="6396217" y="3174435"/>
+            <a:ext cx="1055777" cy="338554"/>
           </a:xfrm>
           <a:prstGeom prst="rect">
             <a:avLst/>
@@ -4922,8 +4870,12 @@
           <a:lstStyle/>
           <a:p>
             <a:r>
-              <a:rPr lang="de-DE" sz="1050" i="1"/>
-              <a:t>metadata table</a:t>
+              <a:rPr lang="de-DE" sz="800" i="1">
+                <a:solidFill>
+                  <a:srgbClr val="820000"/>
+                </a:solidFill>
+              </a:rPr>
+              <a:t>delete/keep due to policy</a:t>
             </a:r>
           </a:p>
         </p:txBody>
@@ -4972,8 +4924,8 @@
         </p:nvSpPr>
         <p:spPr>
           <a:xfrm>
-            <a:off x="648234" y="805979"/>
-            <a:ext cx="4452471" cy="1060785"/>
+            <a:off x="1462517" y="864659"/>
+            <a:ext cx="5892730" cy="1060785"/>
           </a:xfrm>
           <a:prstGeom prst="rect">
             <a:avLst/>
@@ -5023,8 +4975,8 @@
         </p:nvSpPr>
         <p:spPr>
           <a:xfrm>
-            <a:off x="648234" y="2355462"/>
-            <a:ext cx="4452471" cy="1507377"/>
+            <a:off x="1462517" y="2453206"/>
+            <a:ext cx="5991185" cy="1507377"/>
           </a:xfrm>
           <a:prstGeom prst="rect">
             <a:avLst/>
@@ -5074,8 +5026,8 @@
         </p:nvSpPr>
         <p:spPr>
           <a:xfrm>
-            <a:off x="3068704" y="1922005"/>
-            <a:ext cx="1834766" cy="400110"/>
+            <a:off x="5364328" y="1993436"/>
+            <a:ext cx="1834766" cy="369332"/>
           </a:xfrm>
           <a:prstGeom prst="rect">
             <a:avLst/>
@@ -5089,12 +5041,12 @@
           <a:lstStyle/>
           <a:p>
             <a:r>
-              <a:rPr lang="de-DE" sz="1000" i="1">
+              <a:rPr lang="de-DE" sz="900" i="1">
                 <a:solidFill>
                   <a:srgbClr val="00B050"/>
                 </a:solidFill>
               </a:rPr>
-              <a:t>Add device to MWDI deviceList, metadata table</a:t>
+              <a:t>Add device to MWDI deviceList, initialize metadata attributes</a:t>
             </a:r>
           </a:p>
         </p:txBody>
@@ -5130,7 +5082,7 @@
         </p:blipFill>
         <p:spPr>
           <a:xfrm>
-            <a:off x="2323319" y="2418715"/>
+            <a:off x="3872837" y="2458961"/>
             <a:ext cx="457200" cy="457200"/>
           </a:xfrm>
           <a:prstGeom prst="rect">
@@ -5152,7 +5104,7 @@
         </p:nvSpPr>
         <p:spPr>
           <a:xfrm>
-            <a:off x="815962" y="2524204"/>
+            <a:off x="4293599" y="2534720"/>
             <a:ext cx="856003" cy="253916"/>
           </a:xfrm>
           <a:prstGeom prst="rect">
@@ -5204,7 +5156,7 @@
         </p:blipFill>
         <p:spPr>
           <a:xfrm>
-            <a:off x="505333" y="3609520"/>
+            <a:off x="1474291" y="3726933"/>
             <a:ext cx="331940" cy="331940"/>
           </a:xfrm>
           <a:prstGeom prst="rect">
@@ -5226,7 +5178,7 @@
         </p:nvSpPr>
         <p:spPr>
           <a:xfrm>
-            <a:off x="794258" y="2980626"/>
+            <a:off x="4369139" y="2953494"/>
             <a:ext cx="1232922" cy="415498"/>
           </a:xfrm>
           <a:prstGeom prst="rect">
@@ -5269,7 +5221,7 @@
         </p:blipFill>
         <p:spPr>
           <a:xfrm>
-            <a:off x="2330527" y="2960413"/>
+            <a:off x="3880045" y="3000659"/>
             <a:ext cx="243158" cy="303949"/>
           </a:xfrm>
           <a:prstGeom prst="rect">
@@ -5299,7 +5251,7 @@
         </p:blipFill>
         <p:spPr>
           <a:xfrm>
-            <a:off x="2557839" y="2969860"/>
+            <a:off x="4107357" y="3010106"/>
             <a:ext cx="243158" cy="303949"/>
           </a:xfrm>
           <a:prstGeom prst="rect">
@@ -5329,7 +5281,7 @@
         </p:blipFill>
         <p:spPr>
           <a:xfrm>
-            <a:off x="2422191" y="3054328"/>
+            <a:off x="3971709" y="3094574"/>
             <a:ext cx="243158" cy="303949"/>
           </a:xfrm>
           <a:prstGeom prst="rect">
@@ -5351,8 +5303,8 @@
         </p:nvSpPr>
         <p:spPr>
           <a:xfrm>
-            <a:off x="607092" y="3631583"/>
-            <a:ext cx="2696056" cy="276999"/>
+            <a:off x="1655264" y="3729327"/>
+            <a:ext cx="2649758" cy="276999"/>
           </a:xfrm>
           <a:prstGeom prst="rect">
             <a:avLst/>
@@ -5393,8 +5345,8 @@
         </p:nvCxnSpPr>
         <p:spPr>
           <a:xfrm flipH="1">
-            <a:off x="2734446" y="1802040"/>
-            <a:ext cx="480282" cy="695765"/>
+            <a:off x="4246404" y="1837782"/>
+            <a:ext cx="1355657" cy="747575"/>
           </a:xfrm>
           <a:prstGeom prst="straightConnector1">
             <a:avLst/>
@@ -5437,8 +5389,8 @@
         </p:nvCxnSpPr>
         <p:spPr>
           <a:xfrm>
-            <a:off x="1782723" y="1750230"/>
-            <a:ext cx="595032" cy="747575"/>
+            <a:off x="2313443" y="1837782"/>
+            <a:ext cx="1412560" cy="747575"/>
           </a:xfrm>
           <a:prstGeom prst="straightConnector1">
             <a:avLst/>
@@ -5479,7 +5431,7 @@
         </p:nvSpPr>
         <p:spPr>
           <a:xfrm>
-            <a:off x="2847196" y="2112188"/>
+            <a:off x="5020805" y="2043224"/>
             <a:ext cx="190500" cy="176580"/>
           </a:xfrm>
           <a:prstGeom prst="mathPlus">
@@ -5523,60 +5475,6 @@
       </p:sp>
       <p:sp>
         <p:nvSpPr>
-          <p:cNvPr id="47" name="Multiplikationszeichen 46">
-            <a:extLst>
-              <a:ext uri="{FF2B5EF4-FFF2-40B4-BE49-F238E27FC236}">
-                <a16:creationId xmlns:a16="http://schemas.microsoft.com/office/drawing/2014/main" id="{0EFCEBB7-A3AE-5565-EE32-A96F8665C432}"/>
-              </a:ext>
-            </a:extLst>
-          </p:cNvPr>
-          <p:cNvSpPr/>
-          <p:nvPr/>
-        </p:nvSpPr>
-        <p:spPr>
-          <a:xfrm>
-            <a:off x="1955120" y="1960709"/>
-            <a:ext cx="156893" cy="148292"/>
-          </a:xfrm>
-          <a:prstGeom prst="mathMultiply">
-            <a:avLst/>
-          </a:prstGeom>
-          <a:solidFill>
-            <a:srgbClr val="CC0000"/>
-          </a:solidFill>
-          <a:ln>
-            <a:solidFill>
-              <a:srgbClr val="7A0000"/>
-            </a:solidFill>
-          </a:ln>
-        </p:spPr>
-        <p:style>
-          <a:lnRef idx="2">
-            <a:schemeClr val="accent1">
-              <a:shade val="50000"/>
-            </a:schemeClr>
-          </a:lnRef>
-          <a:fillRef idx="1">
-            <a:schemeClr val="accent1"/>
-          </a:fillRef>
-          <a:effectRef idx="0">
-            <a:schemeClr val="accent1"/>
-          </a:effectRef>
-          <a:fontRef idx="minor">
-            <a:schemeClr val="lt1"/>
-          </a:fontRef>
-        </p:style>
-        <p:txBody>
-          <a:bodyPr rtlCol="0" anchor="ctr"/>
-          <a:lstStyle/>
-          <a:p>
-            <a:pPr algn="ctr"/>
-            <a:endParaRPr lang="de-DE" i="1"/>
-          </a:p>
-        </p:txBody>
-      </p:sp>
-      <p:sp>
-        <p:nvSpPr>
           <p:cNvPr id="2" name="Textfeld 1">
             <a:extLst>
               <a:ext uri="{FF2B5EF4-FFF2-40B4-BE49-F238E27FC236}">
@@ -5589,8 +5487,8 @@
         </p:nvSpPr>
         <p:spPr>
           <a:xfrm>
-            <a:off x="909252" y="786377"/>
-            <a:ext cx="4259926" cy="1015663"/>
+            <a:off x="1723535" y="845057"/>
+            <a:ext cx="5458176" cy="1015663"/>
           </a:xfrm>
           <a:prstGeom prst="rect">
             <a:avLst/>
@@ -5609,7 +5507,7 @@
             </a:r>
             <a:r>
               <a:rPr lang="de-DE" sz="1200"/>
-              <a:t>: sends controller-attribute-value-change notification about devices on the Controller:</a:t>
+              <a:t>: sends controller-attribute-value-change notification about devices on the Controller (via Kafka):</a:t>
             </a:r>
           </a:p>
           <a:p>
@@ -5624,7 +5522,7 @@
           <a:p>
             <a:r>
               <a:rPr lang="de-DE" sz="1200" b="1"/>
-              <a:t>        &lt;not-connected&gt;	         connected	</a:t>
+              <a:t>        &lt;not-connected&gt;	         		connected	</a:t>
             </a:r>
           </a:p>
         </p:txBody>
@@ -5640,15 +5538,13 @@
           </p:cNvPr>
           <p:cNvCxnSpPr>
             <a:cxnSpLocks/>
-            <a:stCxn id="47" idx="0"/>
-            <a:endCxn id="33" idx="1"/>
           </p:cNvCxnSpPr>
           <p:nvPr/>
         </p:nvCxnSpPr>
         <p:spPr>
           <a:xfrm>
-            <a:off x="1992802" y="1996325"/>
-            <a:ext cx="337725" cy="1116063"/>
+            <a:off x="2314125" y="1837782"/>
+            <a:ext cx="1364650" cy="1362158"/>
           </a:xfrm>
           <a:prstGeom prst="straightConnector1">
             <a:avLst/>
@@ -5689,8 +5585,8 @@
         </p:nvSpPr>
         <p:spPr>
           <a:xfrm>
-            <a:off x="794258" y="1965301"/>
-            <a:ext cx="1285981" cy="400110"/>
+            <a:off x="2957146" y="1894275"/>
+            <a:ext cx="1794545" cy="369332"/>
           </a:xfrm>
           <a:prstGeom prst="rect">
             <a:avLst/>
@@ -5704,12 +5600,12 @@
           <a:lstStyle/>
           <a:p>
             <a:r>
-              <a:rPr lang="de-DE" sz="1000" i="1">
+              <a:rPr lang="de-DE" sz="900" i="1">
                 <a:solidFill>
-                  <a:srgbClr val="C00000"/>
+                  <a:srgbClr val="820000"/>
                 </a:solidFill>
               </a:rPr>
-              <a:t>delete device &amp; ControlConstruct</a:t>
+              <a:t>mark device as disconnected, update metadata</a:t>
             </a:r>
           </a:p>
         </p:txBody>
@@ -5745,7 +5641,7 @@
         </p:blipFill>
         <p:spPr>
           <a:xfrm>
-            <a:off x="505333" y="666681"/>
+            <a:off x="1319616" y="725361"/>
             <a:ext cx="486615" cy="486615"/>
           </a:xfrm>
           <a:prstGeom prst="rect">
@@ -5767,7 +5663,7 @@
         </p:nvSpPr>
         <p:spPr>
           <a:xfrm>
-            <a:off x="3387847" y="2342944"/>
+            <a:off x="5717231" y="2440688"/>
             <a:ext cx="1736472" cy="900246"/>
           </a:xfrm>
           <a:prstGeom prst="rect">
@@ -5789,7 +5685,7 @@
                   </a:schemeClr>
                 </a:solidFill>
               </a:rPr>
-              <a:t>ControlConstruct will not be retrieved immediately, but according to slidingWindow approach (uses metadata table for prioritization)</a:t>
+              <a:t>ControlConstruct will not be retrieved immediately, but according to slidingWindow approach (uses metadata info for prioritization)</a:t>
             </a:r>
           </a:p>
         </p:txBody>
@@ -5808,8 +5704,8 @@
         </p:nvSpPr>
         <p:spPr>
           <a:xfrm>
-            <a:off x="266297" y="668407"/>
-            <a:ext cx="4953126" cy="3349613"/>
+            <a:off x="1153998" y="766151"/>
+            <a:ext cx="6394809" cy="3349613"/>
           </a:xfrm>
           <a:prstGeom prst="rect">
             <a:avLst/>
@@ -5863,8 +5759,8 @@
         </p:nvSpPr>
         <p:spPr>
           <a:xfrm>
-            <a:off x="266979" y="359358"/>
-            <a:ext cx="4953126" cy="307777"/>
+            <a:off x="1154680" y="457102"/>
+            <a:ext cx="6394809" cy="307777"/>
           </a:xfrm>
           <a:prstGeom prst="rect">
             <a:avLst/>
@@ -5895,6 +5791,138 @@
                 </a:solidFill>
               </a:rPr>
               <a:t>Notification-based deviceList updates</a:t>
+            </a:r>
+          </a:p>
+        </p:txBody>
+      </p:sp>
+      <p:sp>
+        <p:nvSpPr>
+          <p:cNvPr id="4" name="Textfeld 3">
+            <a:extLst>
+              <a:ext uri="{FF2B5EF4-FFF2-40B4-BE49-F238E27FC236}">
+                <a16:creationId xmlns:a16="http://schemas.microsoft.com/office/drawing/2014/main" id="{0F624961-A8DA-4165-3336-943A236FF61B}"/>
+              </a:ext>
+            </a:extLst>
+          </p:cNvPr>
+          <p:cNvSpPr txBox="1"/>
+          <p:nvPr/>
+        </p:nvSpPr>
+        <p:spPr>
+          <a:xfrm>
+            <a:off x="2800253" y="2165248"/>
+            <a:ext cx="268022" cy="307777"/>
+          </a:xfrm>
+          <a:prstGeom prst="rect">
+            <a:avLst/>
+          </a:prstGeom>
+          <a:noFill/>
+        </p:spPr>
+        <p:txBody>
+          <a:bodyPr wrap="none" rtlCol="0">
+            <a:spAutoFit/>
+          </a:bodyPr>
+          <a:lstStyle/>
+          <a:p>
+            <a:r>
+              <a:rPr lang="de-DE" sz="1400">
+                <a:solidFill>
+                  <a:srgbClr val="820000"/>
+                </a:solidFill>
+              </a:rPr>
+              <a:t>?</a:t>
+            </a:r>
+          </a:p>
+        </p:txBody>
+      </p:sp>
+      <p:sp>
+        <p:nvSpPr>
+          <p:cNvPr id="47" name="Multiplikationszeichen 46">
+            <a:extLst>
+              <a:ext uri="{FF2B5EF4-FFF2-40B4-BE49-F238E27FC236}">
+                <a16:creationId xmlns:a16="http://schemas.microsoft.com/office/drawing/2014/main" id="{0EFCEBB7-A3AE-5565-EE32-A96F8665C432}"/>
+              </a:ext>
+            </a:extLst>
+          </p:cNvPr>
+          <p:cNvSpPr/>
+          <p:nvPr/>
+        </p:nvSpPr>
+        <p:spPr>
+          <a:xfrm>
+            <a:off x="2742157" y="2256248"/>
+            <a:ext cx="156893" cy="148292"/>
+          </a:xfrm>
+          <a:prstGeom prst="mathMultiply">
+            <a:avLst/>
+          </a:prstGeom>
+          <a:solidFill>
+            <a:srgbClr val="CC0000"/>
+          </a:solidFill>
+          <a:ln>
+            <a:solidFill>
+              <a:srgbClr val="7A0000"/>
+            </a:solidFill>
+          </a:ln>
+        </p:spPr>
+        <p:style>
+          <a:lnRef idx="2">
+            <a:schemeClr val="accent1">
+              <a:shade val="50000"/>
+            </a:schemeClr>
+          </a:lnRef>
+          <a:fillRef idx="1">
+            <a:schemeClr val="accent1"/>
+          </a:fillRef>
+          <a:effectRef idx="0">
+            <a:schemeClr val="accent1"/>
+          </a:effectRef>
+          <a:fontRef idx="minor">
+            <a:schemeClr val="lt1"/>
+          </a:fontRef>
+        </p:style>
+        <p:txBody>
+          <a:bodyPr rtlCol="0" anchor="ctr"/>
+          <a:lstStyle/>
+          <a:p>
+            <a:pPr algn="ctr"/>
+            <a:endParaRPr lang="de-DE" i="1"/>
+          </a:p>
+        </p:txBody>
+      </p:sp>
+      <p:sp>
+        <p:nvSpPr>
+          <p:cNvPr id="8" name="Textfeld 7">
+            <a:extLst>
+              <a:ext uri="{FF2B5EF4-FFF2-40B4-BE49-F238E27FC236}">
+                <a16:creationId xmlns:a16="http://schemas.microsoft.com/office/drawing/2014/main" id="{57A860E1-DF46-7105-0B18-E5900C5BC9FB}"/>
+              </a:ext>
+            </a:extLst>
+          </p:cNvPr>
+          <p:cNvSpPr txBox="1"/>
+          <p:nvPr/>
+        </p:nvSpPr>
+        <p:spPr>
+          <a:xfrm>
+            <a:off x="1818792" y="2019150"/>
+            <a:ext cx="833216" cy="369332"/>
+          </a:xfrm>
+          <a:prstGeom prst="rect">
+            <a:avLst/>
+          </a:prstGeom>
+          <a:noFill/>
+        </p:spPr>
+        <p:txBody>
+          <a:bodyPr wrap="square" rtlCol="0">
+            <a:spAutoFit/>
+          </a:bodyPr>
+          <a:lstStyle/>
+          <a:p>
+            <a:r>
+              <a:rPr lang="de-DE" sz="900" i="1">
+                <a:solidFill>
+                  <a:srgbClr val="820000"/>
+                </a:solidFill>
+              </a:rPr>
+              <a:t>delete/keep due to policy</a:t>
             </a:r>
           </a:p>
         </p:txBody>
@@ -6116,121 +6144,6 @@
       </p:sp>
       <p:sp>
         <p:nvSpPr>
-          <p:cNvPr id="6" name="Textfeld 5">
-            <a:extLst>
-              <a:ext uri="{FF2B5EF4-FFF2-40B4-BE49-F238E27FC236}">
-                <a16:creationId xmlns:a16="http://schemas.microsoft.com/office/drawing/2014/main" id="{FDF47674-7314-5065-8211-47BFBA59F38C}"/>
-              </a:ext>
-            </a:extLst>
-          </p:cNvPr>
-          <p:cNvSpPr txBox="1"/>
-          <p:nvPr/>
-        </p:nvSpPr>
-        <p:spPr>
-          <a:xfrm>
-            <a:off x="5129031" y="843529"/>
-            <a:ext cx="4404852" cy="2308324"/>
-          </a:xfrm>
-          <a:prstGeom prst="rect">
-            <a:avLst/>
-          </a:prstGeom>
-          <a:noFill/>
-        </p:spPr>
-        <p:txBody>
-          <a:bodyPr wrap="square" rtlCol="0">
-            <a:spAutoFit/>
-          </a:bodyPr>
-          <a:lstStyle/>
-          <a:p>
-            <a:r>
-              <a:rPr lang="de-DE" sz="1200" b="1"/>
-              <a:t>Since MWDI 1.3.0:</a:t>
-            </a:r>
-          </a:p>
-          <a:p>
-            <a:pPr marL="228600" indent="-228600">
-              <a:buFont typeface="+mj-lt"/>
-              <a:buAutoNum type="arabicPeriod"/>
-            </a:pPr>
-            <a:r>
-              <a:rPr lang="de-DE" sz="1200"/>
-              <a:t>Cyclic process to sync deviceLists of Controller and MWDI</a:t>
-            </a:r>
-          </a:p>
-          <a:p>
-            <a:pPr marL="228600" indent="-228600">
-              <a:buFont typeface="+mj-lt"/>
-              <a:buAutoNum type="arabicPeriod"/>
-            </a:pPr>
-            <a:r>
-              <a:rPr lang="de-DE" sz="1200"/>
-              <a:t>Update deviceList and metadataStatusTable</a:t>
-            </a:r>
-          </a:p>
-          <a:p>
-            <a:pPr marL="685800" lvl="1" indent="-228600">
-              <a:buFont typeface="Arial" panose="020B0604020202020204" pitchFamily="34" charset="0"/>
-              <a:buChar char="•"/>
-            </a:pPr>
-            <a:r>
-              <a:rPr lang="de-DE" sz="1200"/>
-              <a:t>Add new connected devices in deviceList</a:t>
-            </a:r>
-          </a:p>
-          <a:p>
-            <a:pPr marL="685800" lvl="1" indent="-228600">
-              <a:buFont typeface="Arial" panose="020B0604020202020204" pitchFamily="34" charset="0"/>
-              <a:buChar char="•"/>
-            </a:pPr>
-            <a:r>
-              <a:rPr lang="de-DE" sz="1200"/>
-              <a:t>Add new connected devices to metadataStatusTable</a:t>
-            </a:r>
-          </a:p>
-          <a:p>
-            <a:pPr marL="1143000" lvl="2" indent="-228600">
-              <a:buFont typeface="Arial" panose="020B0604020202020204" pitchFamily="34" charset="0"/>
-              <a:buChar char="•"/>
-            </a:pPr>
-            <a:r>
-              <a:rPr lang="de-DE" sz="1200"/>
-              <a:t>Set connection-status to connected, if already existing, but not connected before</a:t>
-            </a:r>
-          </a:p>
-          <a:p>
-            <a:pPr marL="685800" lvl="1" indent="-228600">
-              <a:buFont typeface="Arial" panose="020B0604020202020204" pitchFamily="34" charset="0"/>
-              <a:buChar char="•"/>
-            </a:pPr>
-            <a:r>
-              <a:rPr lang="de-DE" sz="1200"/>
-              <a:t>Remove disconnected devices from deviceList, delete CC from cache, update connection-status in metadataStatusTable</a:t>
-            </a:r>
-          </a:p>
-          <a:p>
-            <a:pPr marL="228600" indent="-228600">
-              <a:buFont typeface="+mj-lt"/>
-              <a:buAutoNum type="arabicPeriod"/>
-            </a:pPr>
-            <a:r>
-              <a:rPr lang="de-DE" sz="1200"/>
-              <a:t>Fill slidingWindow from metadataStatusTable information</a:t>
-            </a:r>
-          </a:p>
-          <a:p>
-            <a:pPr marL="628650" lvl="1" indent="-171450">
-              <a:buFont typeface="Arial" panose="020B0604020202020204" pitchFamily="34" charset="0"/>
-              <a:buChar char="•"/>
-            </a:pPr>
-            <a:r>
-              <a:rPr lang="de-DE" sz="1200"/>
-              <a:t>Initiate CC update from live</a:t>
-            </a:r>
-          </a:p>
-        </p:txBody>
-      </p:sp>
-      <p:sp>
-        <p:nvSpPr>
           <p:cNvPr id="7" name="Rechteck 6">
             <a:extLst>
               <a:ext uri="{FF2B5EF4-FFF2-40B4-BE49-F238E27FC236}">
@@ -6244,7 +6157,7 @@
         <p:spPr>
           <a:xfrm>
             <a:off x="266980" y="735961"/>
-            <a:ext cx="4593172" cy="2415892"/>
+            <a:ext cx="4593172" cy="2874918"/>
           </a:xfrm>
           <a:prstGeom prst="rect">
             <a:avLst/>
@@ -6291,7 +6204,7 @@
         <p:spPr>
           <a:xfrm>
             <a:off x="4860152" y="735961"/>
-            <a:ext cx="4637811" cy="2415892"/>
+            <a:ext cx="4637811" cy="2874918"/>
           </a:xfrm>
           <a:prstGeom prst="rect">
             <a:avLst/>
@@ -6320,6 +6233,150 @@
           <a:p>
             <a:pPr algn="ctr"/>
             <a:endParaRPr lang="de-DE"/>
+          </a:p>
+        </p:txBody>
+      </p:sp>
+      <p:sp>
+        <p:nvSpPr>
+          <p:cNvPr id="9" name="Textfeld 8">
+            <a:extLst>
+              <a:ext uri="{FF2B5EF4-FFF2-40B4-BE49-F238E27FC236}">
+                <a16:creationId xmlns:a16="http://schemas.microsoft.com/office/drawing/2014/main" id="{75131914-D7B2-3A93-8A92-69D1B009A426}"/>
+              </a:ext>
+            </a:extLst>
+          </p:cNvPr>
+          <p:cNvSpPr txBox="1"/>
+          <p:nvPr/>
+        </p:nvSpPr>
+        <p:spPr>
+          <a:xfrm>
+            <a:off x="4882470" y="843529"/>
+            <a:ext cx="4404852" cy="2677656"/>
+          </a:xfrm>
+          <a:prstGeom prst="rect">
+            <a:avLst/>
+          </a:prstGeom>
+          <a:noFill/>
+        </p:spPr>
+        <p:txBody>
+          <a:bodyPr wrap="square" rtlCol="0">
+            <a:spAutoFit/>
+          </a:bodyPr>
+          <a:lstStyle/>
+          <a:p>
+            <a:r>
+              <a:rPr lang="de-DE" sz="1200" b="1"/>
+              <a:t>With MWDI 1.3.x+:</a:t>
+            </a:r>
+          </a:p>
+          <a:p>
+            <a:pPr marL="228600" indent="-228600">
+              <a:buFont typeface="+mj-lt"/>
+              <a:buAutoNum type="arabicPeriod"/>
+            </a:pPr>
+            <a:r>
+              <a:rPr lang="de-DE" sz="1200"/>
+              <a:t>Cyclic process to sync deviceLists of Controller and MWDI</a:t>
+            </a:r>
+          </a:p>
+          <a:p>
+            <a:pPr marL="228600" indent="-228600">
+              <a:buFont typeface="+mj-lt"/>
+              <a:buAutoNum type="arabicPeriod"/>
+            </a:pPr>
+            <a:r>
+              <a:rPr lang="de-DE" sz="1200"/>
+              <a:t>Newly connected devices:</a:t>
+            </a:r>
+          </a:p>
+          <a:p>
+            <a:pPr marL="628650" lvl="1" indent="-171450">
+              <a:buFont typeface="Arial" panose="020B0604020202020204" pitchFamily="34" charset="0"/>
+              <a:buChar char="•"/>
+            </a:pPr>
+            <a:r>
+              <a:rPr lang="de-DE" sz="1200"/>
+              <a:t>Added to deviceList</a:t>
+            </a:r>
+          </a:p>
+          <a:p>
+            <a:pPr marL="628650" lvl="1" indent="-171450">
+              <a:buFont typeface="Arial" panose="020B0604020202020204" pitchFamily="34" charset="0"/>
+              <a:buChar char="•"/>
+            </a:pPr>
+            <a:r>
+              <a:rPr lang="de-DE" sz="1200"/>
+              <a:t>Metadata attributes initalized</a:t>
+            </a:r>
+          </a:p>
+          <a:p>
+            <a:pPr marL="628650" lvl="1" indent="-171450">
+              <a:buFont typeface="Arial" panose="020B0604020202020204" pitchFamily="34" charset="0"/>
+              <a:buChar char="•"/>
+            </a:pPr>
+            <a:r>
+              <a:rPr lang="de-DE" sz="1200"/>
+              <a:t>Sort into deviceList with priority (based on metadata)</a:t>
+            </a:r>
+          </a:p>
+          <a:p>
+            <a:pPr marL="228600" indent="-228600">
+              <a:buFont typeface="+mj-lt"/>
+              <a:buAutoNum type="arabicPeriod"/>
+            </a:pPr>
+            <a:r>
+              <a:rPr lang="de-DE" sz="1200"/>
+              <a:t>Disconnected devices:</a:t>
+            </a:r>
+          </a:p>
+          <a:p>
+            <a:pPr marL="628650" lvl="1" indent="-171450">
+              <a:buFont typeface="Arial" panose="020B0604020202020204" pitchFamily="34" charset="0"/>
+              <a:buChar char="•"/>
+            </a:pPr>
+            <a:r>
+              <a:rPr lang="de-DE" sz="1200"/>
+              <a:t>Mark as disconnected in deviceList</a:t>
+            </a:r>
+          </a:p>
+          <a:p>
+            <a:pPr marL="628650" lvl="1" indent="-171450">
+              <a:buFont typeface="Arial" panose="020B0604020202020204" pitchFamily="34" charset="0"/>
+              <a:buChar char="•"/>
+            </a:pPr>
+            <a:r>
+              <a:rPr lang="de-DE" sz="1200"/>
+              <a:t>CC deleted from/kept cache according to policy</a:t>
+            </a:r>
+          </a:p>
+          <a:p>
+            <a:endParaRPr lang="de-DE" sz="1200"/>
+          </a:p>
+          <a:p>
+            <a:r>
+              <a:rPr lang="de-DE" sz="1200"/>
+              <a:t>DeviceList metadata: </a:t>
+            </a:r>
+          </a:p>
+          <a:p>
+            <a:pPr marL="628650" lvl="1" indent="-171450">
+              <a:buFont typeface="Arial" panose="020B0604020202020204" pitchFamily="34" charset="0"/>
+              <a:buChar char="•"/>
+            </a:pPr>
+            <a:r>
+              <a:rPr lang="de-DE" sz="1200"/>
+              <a:t>Update according to connection-status changes and controlConstruct updates</a:t>
+            </a:r>
+          </a:p>
+          <a:p>
+            <a:pPr marL="628650" lvl="1" indent="-171450">
+              <a:buFont typeface="Arial" panose="020B0604020202020204" pitchFamily="34" charset="0"/>
+              <a:buChar char="•"/>
+            </a:pPr>
+            <a:r>
+              <a:rPr lang="de-DE" sz="1200"/>
+              <a:t>(Disconnected) devices only deleted due to retention</a:t>
+            </a:r>
           </a:p>
         </p:txBody>
       </p:sp>

</xml_diff>